<commit_message>
changes from this week: relabeling, fixed maps, and ran models
</commit_message>
<xml_diff>
--- a/Figures/otherfigs.pptx
+++ b/Figures/otherfigs.pptx
@@ -9,8 +9,8 @@
     <p:sldId id="258" r:id="rId3"/>
     <p:sldId id="259" r:id="rId4"/>
     <p:sldId id="260" r:id="rId5"/>
-    <p:sldId id="261" r:id="rId6"/>
-    <p:sldId id="262" r:id="rId7"/>
+    <p:sldId id="262" r:id="rId6"/>
+    <p:sldId id="261" r:id="rId7"/>
     <p:sldId id="263" r:id="rId8"/>
     <p:sldId id="266" r:id="rId9"/>
     <p:sldId id="264" r:id="rId10"/>
@@ -5578,7 +5578,7 @@
           <a:p>
             <a:fld id="{6A5C3B43-3A63-CA4E-9C00-1AA686BB8827}" type="datetimeFigureOut">
               <a:rPr lang="en-US" smtClean="0"/>
-              <a:t>3/22/24</a:t>
+              <a:t>3/27/24</a:t>
             </a:fld>
             <a:endParaRPr lang="en-US"/>
           </a:p>
@@ -5776,7 +5776,7 @@
           <a:p>
             <a:fld id="{6A5C3B43-3A63-CA4E-9C00-1AA686BB8827}" type="datetimeFigureOut">
               <a:rPr lang="en-US" smtClean="0"/>
-              <a:t>3/22/24</a:t>
+              <a:t>3/27/24</a:t>
             </a:fld>
             <a:endParaRPr lang="en-US"/>
           </a:p>
@@ -5984,7 +5984,7 @@
           <a:p>
             <a:fld id="{6A5C3B43-3A63-CA4E-9C00-1AA686BB8827}" type="datetimeFigureOut">
               <a:rPr lang="en-US" smtClean="0"/>
-              <a:t>3/22/24</a:t>
+              <a:t>3/27/24</a:t>
             </a:fld>
             <a:endParaRPr lang="en-US"/>
           </a:p>
@@ -6182,7 +6182,7 @@
           <a:p>
             <a:fld id="{6A5C3B43-3A63-CA4E-9C00-1AA686BB8827}" type="datetimeFigureOut">
               <a:rPr lang="en-US" smtClean="0"/>
-              <a:t>3/22/24</a:t>
+              <a:t>3/27/24</a:t>
             </a:fld>
             <a:endParaRPr lang="en-US"/>
           </a:p>
@@ -6457,7 +6457,7 @@
           <a:p>
             <a:fld id="{6A5C3B43-3A63-CA4E-9C00-1AA686BB8827}" type="datetimeFigureOut">
               <a:rPr lang="en-US" smtClean="0"/>
-              <a:t>3/22/24</a:t>
+              <a:t>3/27/24</a:t>
             </a:fld>
             <a:endParaRPr lang="en-US"/>
           </a:p>
@@ -6722,7 +6722,7 @@
           <a:p>
             <a:fld id="{6A5C3B43-3A63-CA4E-9C00-1AA686BB8827}" type="datetimeFigureOut">
               <a:rPr lang="en-US" smtClean="0"/>
-              <a:t>3/22/24</a:t>
+              <a:t>3/27/24</a:t>
             </a:fld>
             <a:endParaRPr lang="en-US"/>
           </a:p>
@@ -7134,7 +7134,7 @@
           <a:p>
             <a:fld id="{6A5C3B43-3A63-CA4E-9C00-1AA686BB8827}" type="datetimeFigureOut">
               <a:rPr lang="en-US" smtClean="0"/>
-              <a:t>3/22/24</a:t>
+              <a:t>3/27/24</a:t>
             </a:fld>
             <a:endParaRPr lang="en-US"/>
           </a:p>
@@ -7275,7 +7275,7 @@
           <a:p>
             <a:fld id="{6A5C3B43-3A63-CA4E-9C00-1AA686BB8827}" type="datetimeFigureOut">
               <a:rPr lang="en-US" smtClean="0"/>
-              <a:t>3/22/24</a:t>
+              <a:t>3/27/24</a:t>
             </a:fld>
             <a:endParaRPr lang="en-US"/>
           </a:p>
@@ -7388,7 +7388,7 @@
           <a:p>
             <a:fld id="{6A5C3B43-3A63-CA4E-9C00-1AA686BB8827}" type="datetimeFigureOut">
               <a:rPr lang="en-US" smtClean="0"/>
-              <a:t>3/22/24</a:t>
+              <a:t>3/27/24</a:t>
             </a:fld>
             <a:endParaRPr lang="en-US"/>
           </a:p>
@@ -7699,7 +7699,7 @@
           <a:p>
             <a:fld id="{6A5C3B43-3A63-CA4E-9C00-1AA686BB8827}" type="datetimeFigureOut">
               <a:rPr lang="en-US" smtClean="0"/>
-              <a:t>3/22/24</a:t>
+              <a:t>3/27/24</a:t>
             </a:fld>
             <a:endParaRPr lang="en-US"/>
           </a:p>
@@ -7987,7 +7987,7 @@
           <a:p>
             <a:fld id="{6A5C3B43-3A63-CA4E-9C00-1AA686BB8827}" type="datetimeFigureOut">
               <a:rPr lang="en-US" smtClean="0"/>
-              <a:t>3/22/24</a:t>
+              <a:t>3/27/24</a:t>
             </a:fld>
             <a:endParaRPr lang="en-US"/>
           </a:p>
@@ -8231,7 +8231,7 @@
           <a:p>
             <a:fld id="{6A5C3B43-3A63-CA4E-9C00-1AA686BB8827}" type="datetimeFigureOut">
               <a:rPr lang="en-US" smtClean="0"/>
-              <a:t>3/22/24</a:t>
+              <a:t>3/27/24</a:t>
             </a:fld>
             <a:endParaRPr lang="en-US"/>
           </a:p>
@@ -11115,10 +11115,10 @@
       </p:grpSpPr>
       <p:pic>
         <p:nvPicPr>
-          <p:cNvPr id="3" name="Picture 2" descr="A map of the state of massachusetts&#10;&#10;Description automatically generated">
+          <p:cNvPr id="6" name="Picture 5" descr="A map of the state of massachusetts&#10;&#10;Description automatically generated">
             <a:extLst>
               <a:ext uri="{FF2B5EF4-FFF2-40B4-BE49-F238E27FC236}">
-                <a16:creationId xmlns:a16="http://schemas.microsoft.com/office/drawing/2014/main" id="{E32ECB13-18DD-804B-92A9-A921D3A8735F}"/>
+                <a16:creationId xmlns:a16="http://schemas.microsoft.com/office/drawing/2014/main" id="{1CC8CAC2-2E35-DF2D-1E0B-8DD65DBC6263}"/>
               </a:ext>
             </a:extLst>
           </p:cNvPr>
@@ -11129,13 +11129,13 @@
         </p:nvPicPr>
         <p:blipFill rotWithShape="1">
           <a:blip r:embed="rId2"/>
-          <a:srcRect t="16470" b="16392"/>
+          <a:srcRect l="2174" t="20965" r="2206" b="20566"/>
           <a:stretch/>
         </p:blipFill>
         <p:spPr>
           <a:xfrm>
-            <a:off x="913589" y="464763"/>
-            <a:ext cx="9564359" cy="5971762"/>
+            <a:off x="1223492" y="586084"/>
+            <a:ext cx="9298547" cy="5685832"/>
           </a:xfrm>
           <a:prstGeom prst="rect">
             <a:avLst/>
@@ -11145,7 +11145,7 @@
     </p:spTree>
     <p:extLst>
       <p:ext uri="{BB962C8B-B14F-4D97-AF65-F5344CB8AC3E}">
-        <p14:creationId xmlns:p14="http://schemas.microsoft.com/office/powerpoint/2010/main" val="2973480249"/>
+        <p14:creationId xmlns:p14="http://schemas.microsoft.com/office/powerpoint/2010/main" val="817236913"/>
       </p:ext>
     </p:extLst>
   </p:cSld>
@@ -11174,10 +11174,10 @@
       </p:grpSpPr>
       <p:pic>
         <p:nvPicPr>
-          <p:cNvPr id="3" name="Picture 2" descr="A map of the state of massachusetts&#10;&#10;Description automatically generated">
+          <p:cNvPr id="8" name="Picture 7" descr="A map of the state of massachusetts&#10;&#10;Description automatically generated">
             <a:extLst>
               <a:ext uri="{FF2B5EF4-FFF2-40B4-BE49-F238E27FC236}">
-                <a16:creationId xmlns:a16="http://schemas.microsoft.com/office/drawing/2014/main" id="{95E80B76-8952-7834-95F1-7AE93339493E}"/>
+                <a16:creationId xmlns:a16="http://schemas.microsoft.com/office/drawing/2014/main" id="{C601990A-3DA8-51CC-8A0F-A11015675112}"/>
               </a:ext>
             </a:extLst>
           </p:cNvPr>
@@ -11188,13 +11188,13 @@
         </p:nvPicPr>
         <p:blipFill rotWithShape="1">
           <a:blip r:embed="rId2"/>
-          <a:srcRect t="16628" b="16549"/>
+          <a:srcRect l="2106" t="20484" r="3107" b="21137"/>
           <a:stretch/>
         </p:blipFill>
         <p:spPr>
           <a:xfrm>
-            <a:off x="1559047" y="464655"/>
-            <a:ext cx="9736482" cy="6050822"/>
+            <a:off x="1442432" y="859052"/>
+            <a:ext cx="8525816" cy="5250992"/>
           </a:xfrm>
           <a:prstGeom prst="rect">
             <a:avLst/>
@@ -11204,7 +11204,7 @@
     </p:spTree>
     <p:extLst>
       <p:ext uri="{BB962C8B-B14F-4D97-AF65-F5344CB8AC3E}">
-        <p14:creationId xmlns:p14="http://schemas.microsoft.com/office/powerpoint/2010/main" val="817236913"/>
+        <p14:creationId xmlns:p14="http://schemas.microsoft.com/office/powerpoint/2010/main" val="2973480249"/>
       </p:ext>
     </p:extLst>
   </p:cSld>
@@ -11233,10 +11233,10 @@
       </p:grpSpPr>
       <p:pic>
         <p:nvPicPr>
-          <p:cNvPr id="3" name="Picture 2" descr="A map of the state of massachusetts&#10;&#10;Description automatically generated">
+          <p:cNvPr id="6" name="Picture 5" descr="A map of the state of massachusetts&#10;&#10;Description automatically generated">
             <a:extLst>
               <a:ext uri="{FF2B5EF4-FFF2-40B4-BE49-F238E27FC236}">
-                <a16:creationId xmlns:a16="http://schemas.microsoft.com/office/drawing/2014/main" id="{73495030-F05B-613A-BABB-0B36F28897E6}"/>
+                <a16:creationId xmlns:a16="http://schemas.microsoft.com/office/drawing/2014/main" id="{6375D4FE-C5BF-741D-CC5A-02CABFD8F30E}"/>
               </a:ext>
             </a:extLst>
           </p:cNvPr>
@@ -11247,13 +11247,13 @@
         </p:nvPicPr>
         <p:blipFill rotWithShape="1">
           <a:blip r:embed="rId2"/>
-          <a:srcRect t="16470" b="16235"/>
+          <a:srcRect l="2534" t="20485" r="2249" b="20378"/>
           <a:stretch/>
         </p:blipFill>
         <p:spPr>
           <a:xfrm>
-            <a:off x="1140310" y="401459"/>
-            <a:ext cx="9864763" cy="6173718"/>
+            <a:off x="1781577" y="749414"/>
+            <a:ext cx="8628846" cy="5359171"/>
           </a:xfrm>
           <a:prstGeom prst="rect">
             <a:avLst/>

</xml_diff>